<commit_message>
Update 02 - Synapse Development.pptx
</commit_message>
<xml_diff>
--- a/Slides/02 - Synapse Development.pptx
+++ b/Slides/02 - Synapse Development.pptx
@@ -5,7 +5,7 @@
     <p:sldMasterId id="2147483648" r:id="rId1"/>
   </p:sldMasterIdLst>
   <p:notesMasterIdLst>
-    <p:notesMasterId r:id="rId76"/>
+    <p:notesMasterId r:id="rId77"/>
   </p:notesMasterIdLst>
   <p:sldIdLst>
     <p:sldId id="256" r:id="rId2"/>
@@ -57,31 +57,32 @@
     <p:sldId id="305" r:id="rId48"/>
     <p:sldId id="306" r:id="rId49"/>
     <p:sldId id="307" r:id="rId50"/>
-    <p:sldId id="308" r:id="rId51"/>
-    <p:sldId id="333" r:id="rId52"/>
-    <p:sldId id="309" r:id="rId53"/>
-    <p:sldId id="334" r:id="rId54"/>
-    <p:sldId id="310" r:id="rId55"/>
-    <p:sldId id="335" r:id="rId56"/>
-    <p:sldId id="311" r:id="rId57"/>
-    <p:sldId id="260" r:id="rId58"/>
-    <p:sldId id="277" r:id="rId59"/>
-    <p:sldId id="279" r:id="rId60"/>
-    <p:sldId id="278" r:id="rId61"/>
-    <p:sldId id="275" r:id="rId62"/>
-    <p:sldId id="304" r:id="rId63"/>
-    <p:sldId id="297" r:id="rId64"/>
-    <p:sldId id="11934" r:id="rId65"/>
-    <p:sldId id="332" r:id="rId66"/>
-    <p:sldId id="11933" r:id="rId67"/>
-    <p:sldId id="298" r:id="rId68"/>
-    <p:sldId id="301" r:id="rId69"/>
-    <p:sldId id="11936" r:id="rId70"/>
-    <p:sldId id="300" r:id="rId71"/>
-    <p:sldId id="11935" r:id="rId72"/>
-    <p:sldId id="276" r:id="rId73"/>
-    <p:sldId id="261" r:id="rId74"/>
-    <p:sldId id="274" r:id="rId75"/>
+    <p:sldId id="11937" r:id="rId51"/>
+    <p:sldId id="308" r:id="rId52"/>
+    <p:sldId id="333" r:id="rId53"/>
+    <p:sldId id="309" r:id="rId54"/>
+    <p:sldId id="334" r:id="rId55"/>
+    <p:sldId id="310" r:id="rId56"/>
+    <p:sldId id="335" r:id="rId57"/>
+    <p:sldId id="311" r:id="rId58"/>
+    <p:sldId id="260" r:id="rId59"/>
+    <p:sldId id="277" r:id="rId60"/>
+    <p:sldId id="279" r:id="rId61"/>
+    <p:sldId id="278" r:id="rId62"/>
+    <p:sldId id="275" r:id="rId63"/>
+    <p:sldId id="304" r:id="rId64"/>
+    <p:sldId id="297" r:id="rId65"/>
+    <p:sldId id="11934" r:id="rId66"/>
+    <p:sldId id="332" r:id="rId67"/>
+    <p:sldId id="11933" r:id="rId68"/>
+    <p:sldId id="298" r:id="rId69"/>
+    <p:sldId id="301" r:id="rId70"/>
+    <p:sldId id="11936" r:id="rId71"/>
+    <p:sldId id="300" r:id="rId72"/>
+    <p:sldId id="11935" r:id="rId73"/>
+    <p:sldId id="276" r:id="rId74"/>
+    <p:sldId id="261" r:id="rId75"/>
+    <p:sldId id="274" r:id="rId76"/>
   </p:sldIdLst>
   <p:sldSz cx="12192000" cy="6858000"/>
   <p:notesSz cx="6858000" cy="9144000"/>
@@ -602,7 +603,7 @@
           <a:p>
             <a:fld id="{67E65352-95B5-4433-84FB-24BF035F4B44}" type="slidenum">
               <a:rPr lang="en-US" smtClean="0"/>
-              <a:t>66</a:t>
+              <a:t>67</a:t>
             </a:fld>
             <a:endParaRPr lang="en-US"/>
           </a:p>
@@ -9320,7 +9321,7 @@
           <a:p>
             <a:r>
               <a:rPr lang="en-US" dirty="0"/>
-              <a:t>Data Loading Techniques</a:t>
+              <a:t>Raw Data</a:t>
             </a:r>
           </a:p>
         </p:txBody>
@@ -9343,85 +9344,46 @@
         </p:nvSpPr>
         <p:spPr/>
         <p:txBody>
-          <a:bodyPr>
-            <a:normAutofit lnSpcReduction="10000"/>
-          </a:bodyPr>
+          <a:bodyPr/>
           <a:lstStyle/>
           <a:p>
-            <a:pPr marL="0" indent="0">
-              <a:buNone/>
-            </a:pPr>
-            <a:r>
-              <a:rPr lang="en-US" dirty="0"/>
-              <a:t>Batch data loading:</a:t>
-            </a:r>
-          </a:p>
-          <a:p>
-            <a:r>
-              <a:rPr lang="en-US" dirty="0"/>
-              <a:t>Take data from sources and save as CSV or Parquet files</a:t>
-            </a:r>
-          </a:p>
-          <a:p>
-            <a:r>
-              <a:rPr lang="en-US" dirty="0"/>
-              <a:t>One option:  use </a:t>
-            </a:r>
-            <a:r>
-              <a:rPr lang="en-US" dirty="0" err="1"/>
-              <a:t>AzCopy</a:t>
-            </a:r>
-            <a:r>
-              <a:rPr lang="en-US" dirty="0"/>
-              <a:t> to upload data to Data Lake Storage</a:t>
-            </a:r>
-          </a:p>
-          <a:p>
-            <a:pPr lvl="1"/>
-            <a:r>
-              <a:rPr lang="en-US" dirty="0"/>
-              <a:t>Especially easy moving files from S3 or Google Cloud</a:t>
-            </a:r>
-          </a:p>
-          <a:p>
-            <a:pPr marL="0" indent="0">
-              <a:buNone/>
-            </a:pPr>
+            <a:r>
+              <a:rPr lang="en-US" dirty="0"/>
+              <a:t>Information coming from source systems or events</a:t>
+            </a:r>
+          </a:p>
+          <a:p>
+            <a:r>
+              <a:rPr lang="en-US" dirty="0"/>
+              <a:t>Store this incoming information long-term</a:t>
+            </a:r>
+          </a:p>
+          <a:p>
+            <a:r>
+              <a:rPr lang="en-US" dirty="0"/>
+              <a:t>Source systems tend not to save history, so we </a:t>
+            </a:r>
+            <a:r>
+              <a:rPr lang="en-US"/>
+              <a:t>want to do so</a:t>
+            </a:r>
             <a:endParaRPr lang="en-US" dirty="0"/>
           </a:p>
           <a:p>
-            <a:pPr marL="0" indent="0">
-              <a:buNone/>
-            </a:pPr>
-            <a:r>
-              <a:rPr lang="en-US" dirty="0"/>
-              <a:t>Alternative load options:</a:t>
-            </a:r>
-          </a:p>
-          <a:p>
-            <a:r>
-              <a:rPr lang="en-US" dirty="0"/>
-              <a:t>Self-hosted integration runtime on-premises</a:t>
-            </a:r>
-          </a:p>
-          <a:p>
-            <a:r>
-              <a:rPr lang="en-US" dirty="0"/>
-              <a:t>Extract and copy data from Synapse Pipeline</a:t>
-            </a:r>
-          </a:p>
-          <a:p>
-            <a:r>
-              <a:rPr lang="en-US" dirty="0"/>
-              <a:t>Stream in data and handle via Stream Analytics or Spark Streaming</a:t>
-            </a:r>
+            <a:r>
+              <a:rPr lang="en-US" dirty="0"/>
+              <a:t>Able to rebuild later layers in event of bug in code</a:t>
+            </a:r>
+          </a:p>
+          <a:p>
+            <a:endParaRPr lang="en-US" dirty="0"/>
           </a:p>
         </p:txBody>
       </p:sp>
     </p:spTree>
     <p:extLst>
       <p:ext uri="{BB962C8B-B14F-4D97-AF65-F5344CB8AC3E}">
-        <p14:creationId xmlns:p14="http://schemas.microsoft.com/office/powerpoint/2010/main" val="4281520794"/>
+        <p14:creationId xmlns:p14="http://schemas.microsoft.com/office/powerpoint/2010/main" val="921300682"/>
       </p:ext>
     </p:extLst>
   </p:cSld>
@@ -9471,7 +9433,7 @@
           <a:p>
             <a:r>
               <a:rPr lang="en-US" dirty="0"/>
-              <a:t>Data Transformation for the Data Lake</a:t>
+              <a:t>Data Loading Techniques</a:t>
             </a:r>
           </a:p>
         </p:txBody>
@@ -9494,74 +9456,77 @@
         </p:nvSpPr>
         <p:spPr/>
         <p:txBody>
-          <a:bodyPr/>
+          <a:bodyPr>
+            <a:normAutofit lnSpcReduction="10000"/>
+          </a:bodyPr>
           <a:lstStyle/>
           <a:p>
-            <a:r>
-              <a:rPr lang="en-US" dirty="0"/>
-              <a:t>Input batch formats</a:t>
+            <a:pPr marL="0" indent="0">
+              <a:buNone/>
+            </a:pPr>
+            <a:r>
+              <a:rPr lang="en-US" dirty="0"/>
+              <a:t>Batch data loading:</a:t>
+            </a:r>
+          </a:p>
+          <a:p>
+            <a:r>
+              <a:rPr lang="en-US" dirty="0"/>
+              <a:t>Take data from sources and save as CSV or Parquet files</a:t>
+            </a:r>
+          </a:p>
+          <a:p>
+            <a:r>
+              <a:rPr lang="en-US" dirty="0"/>
+              <a:t>One option:  use </a:t>
+            </a:r>
+            <a:r>
+              <a:rPr lang="en-US" dirty="0" err="1"/>
+              <a:t>AzCopy</a:t>
+            </a:r>
+            <a:r>
+              <a:rPr lang="en-US" dirty="0"/>
+              <a:t> to upload data to Data Lake Storage</a:t>
             </a:r>
           </a:p>
           <a:p>
             <a:pPr lvl="1"/>
             <a:r>
               <a:rPr lang="en-US" dirty="0"/>
-              <a:t>Delimited text</a:t>
-            </a:r>
-          </a:p>
-          <a:p>
-            <a:pPr lvl="1"/>
-            <a:r>
-              <a:rPr lang="en-US" dirty="0"/>
-              <a:t>Avro</a:t>
-            </a:r>
-          </a:p>
-          <a:p>
-            <a:pPr lvl="1"/>
-            <a:r>
-              <a:rPr lang="en-US" b="1" dirty="0"/>
-              <a:t>Parquet</a:t>
-            </a:r>
-          </a:p>
-          <a:p>
-            <a:pPr lvl="1"/>
-            <a:r>
-              <a:rPr lang="en-US" dirty="0"/>
-              <a:t>ORC</a:t>
-            </a:r>
-          </a:p>
-          <a:p>
-            <a:pPr lvl="1"/>
-            <a:r>
-              <a:rPr lang="en-US" dirty="0"/>
-              <a:t>JSON</a:t>
-            </a:r>
-          </a:p>
-          <a:p>
-            <a:pPr lvl="1"/>
-            <a:r>
-              <a:rPr lang="en-US" dirty="0"/>
-              <a:t>XML</a:t>
-            </a:r>
-          </a:p>
-          <a:p>
-            <a:r>
-              <a:rPr lang="en-US" dirty="0"/>
-              <a:t>Input stream sources</a:t>
-            </a:r>
-          </a:p>
-          <a:p>
-            <a:pPr lvl="1"/>
-            <a:r>
-              <a:rPr lang="en-US" dirty="0"/>
-              <a:t>Event Hub</a:t>
-            </a:r>
-          </a:p>
-          <a:p>
-            <a:pPr lvl="1"/>
-            <a:r>
-              <a:rPr lang="en-US" dirty="0"/>
-              <a:t>IoT Hub</a:t>
+              <a:t>Especially easy moving files from S3 or Google Cloud</a:t>
+            </a:r>
+          </a:p>
+          <a:p>
+            <a:pPr marL="0" indent="0">
+              <a:buNone/>
+            </a:pPr>
+            <a:endParaRPr lang="en-US" dirty="0"/>
+          </a:p>
+          <a:p>
+            <a:pPr marL="0" indent="0">
+              <a:buNone/>
+            </a:pPr>
+            <a:r>
+              <a:rPr lang="en-US" dirty="0"/>
+              <a:t>Alternative load options:</a:t>
+            </a:r>
+          </a:p>
+          <a:p>
+            <a:r>
+              <a:rPr lang="en-US" dirty="0"/>
+              <a:t>Self-hosted integration runtime on-premises</a:t>
+            </a:r>
+          </a:p>
+          <a:p>
+            <a:r>
+              <a:rPr lang="en-US" dirty="0"/>
+              <a:t>Extract and copy data from Synapse Pipeline</a:t>
+            </a:r>
+          </a:p>
+          <a:p>
+            <a:r>
+              <a:rPr lang="en-US" dirty="0"/>
+              <a:t>Stream in data and handle via Stream Analytics or Spark Streaming</a:t>
             </a:r>
           </a:p>
         </p:txBody>
@@ -9569,7 +9534,7 @@
     </p:spTree>
     <p:extLst>
       <p:ext uri="{BB962C8B-B14F-4D97-AF65-F5344CB8AC3E}">
-        <p14:creationId xmlns:p14="http://schemas.microsoft.com/office/powerpoint/2010/main" val="105561005"/>
+        <p14:creationId xmlns:p14="http://schemas.microsoft.com/office/powerpoint/2010/main" val="4281520794"/>
       </p:ext>
     </p:extLst>
   </p:cSld>
@@ -9619,7 +9584,7 @@
           <a:p>
             <a:r>
               <a:rPr lang="en-US" dirty="0"/>
-              <a:t>Data Cleansing Operations</a:t>
+              <a:t>Data Transformation for the Data Lake</a:t>
             </a:r>
           </a:p>
         </p:txBody>
@@ -9647,60 +9612,77 @@
           <a:p>
             <a:r>
               <a:rPr lang="en-US" dirty="0"/>
-              <a:t>Typically handled through Spark pools – Python, Scala, maybe F#/C#</a:t>
-            </a:r>
-          </a:p>
-          <a:p>
-            <a:r>
-              <a:rPr lang="en-US" dirty="0"/>
-              <a:t>Common file issues:</a:t>
+              <a:t>Input batch formats</a:t>
             </a:r>
           </a:p>
           <a:p>
             <a:pPr lvl="1"/>
             <a:r>
               <a:rPr lang="en-US" dirty="0"/>
-              <a:t>Improperly formatted delimited files</a:t>
+              <a:t>Delimited text</a:t>
             </a:r>
           </a:p>
           <a:p>
             <a:pPr lvl="1"/>
             <a:r>
               <a:rPr lang="en-US" dirty="0"/>
-              <a:t>Restructuring free-form text</a:t>
+              <a:t>Avro</a:t>
             </a:r>
           </a:p>
           <a:p>
             <a:pPr lvl="1"/>
             <a:r>
-              <a:rPr lang="en-US" dirty="0"/>
-              <a:t>Nested data</a:t>
+              <a:rPr lang="en-US" b="1" dirty="0"/>
+              <a:t>Parquet</a:t>
             </a:r>
           </a:p>
           <a:p>
             <a:pPr lvl="1"/>
             <a:r>
               <a:rPr lang="en-US" dirty="0"/>
-              <a:t>XML data inside file</a:t>
+              <a:t>ORC</a:t>
             </a:r>
           </a:p>
           <a:p>
             <a:pPr lvl="1"/>
             <a:r>
               <a:rPr lang="en-US" dirty="0"/>
-              <a:t>Missing / NULL entries</a:t>
+              <a:t>JSON</a:t>
             </a:r>
           </a:p>
           <a:p>
             <a:pPr lvl="1"/>
-            <a:endParaRPr lang="en-US" dirty="0"/>
+            <a:r>
+              <a:rPr lang="en-US" dirty="0"/>
+              <a:t>XML</a:t>
+            </a:r>
+          </a:p>
+          <a:p>
+            <a:r>
+              <a:rPr lang="en-US" dirty="0"/>
+              <a:t>Input stream sources</a:t>
+            </a:r>
+          </a:p>
+          <a:p>
+            <a:pPr lvl="1"/>
+            <a:r>
+              <a:rPr lang="en-US" dirty="0"/>
+              <a:t>Event Hub</a:t>
+            </a:r>
+          </a:p>
+          <a:p>
+            <a:pPr lvl="1"/>
+            <a:r>
+              <a:rPr lang="en-US" dirty="0"/>
+              <a:t>IoT Hub</a:t>
+            </a:r>
           </a:p>
         </p:txBody>
       </p:sp>
     </p:spTree>
     <p:extLst>
       <p:ext uri="{BB962C8B-B14F-4D97-AF65-F5344CB8AC3E}">
-        <p14:creationId xmlns:p14="http://schemas.microsoft.com/office/powerpoint/2010/main" val="1109056329"/>
+        <p14:creationId xmlns:p14="http://schemas.microsoft.com/office/powerpoint/2010/main" val="105561005"/>
       </p:ext>
     </p:extLst>
   </p:cSld>
@@ -9778,62 +9760,48 @@
           <a:p>
             <a:r>
               <a:rPr lang="en-US" dirty="0"/>
-              <a:t>Don’t forget data issues!</a:t>
+              <a:t>Typically handled through Spark pools – Python, Scala, maybe F#/C#</a:t>
+            </a:r>
+          </a:p>
+          <a:p>
+            <a:r>
+              <a:rPr lang="en-US" dirty="0"/>
+              <a:t>Common file issues:</a:t>
             </a:r>
           </a:p>
           <a:p>
             <a:pPr lvl="1"/>
             <a:r>
               <a:rPr lang="en-US" dirty="0"/>
-              <a:t>Impossible values (e.g., age &gt; 200, salary &lt; 0)</a:t>
+              <a:t>Improperly formatted delimited files</a:t>
             </a:r>
           </a:p>
           <a:p>
             <a:pPr lvl="1"/>
             <a:r>
               <a:rPr lang="en-US" dirty="0"/>
-              <a:t>Mismatched values (e.g., X in system 1, Y in system 2)</a:t>
+              <a:t>Restructuring free-form text</a:t>
             </a:r>
           </a:p>
           <a:p>
             <a:pPr lvl="1"/>
             <a:r>
               <a:rPr lang="en-US" dirty="0"/>
-              <a:t>Inaccurate data (e.g., need legal name but sent nickname)</a:t>
+              <a:t>Nested data</a:t>
             </a:r>
           </a:p>
           <a:p>
             <a:pPr lvl="1"/>
             <a:r>
               <a:rPr lang="en-US" dirty="0"/>
-              <a:t>Duplicate data</a:t>
+              <a:t>XML data inside file</a:t>
             </a:r>
           </a:p>
           <a:p>
             <a:pPr lvl="1"/>
             <a:r>
               <a:rPr lang="en-US" dirty="0"/>
-              <a:t>Misspellings</a:t>
-            </a:r>
-          </a:p>
-          <a:p>
-            <a:pPr lvl="1"/>
-            <a:r>
-              <a:rPr lang="en-US" dirty="0"/>
-              <a:t>Old data mixed with current (e.g., FLA and MIA Marlins)</a:t>
-            </a:r>
-          </a:p>
-          <a:p>
-            <a:pPr lvl="1"/>
-            <a:r>
-              <a:rPr lang="en-US" dirty="0"/>
-              <a:t>Impute or calculate missing values</a:t>
-            </a:r>
-          </a:p>
-          <a:p>
-            <a:r>
-              <a:rPr lang="en-US" dirty="0"/>
-              <a:t>Reminder:  fix data issues as early as possible, where you have the most information</a:t>
+              <a:t>Missing / NULL entries</a:t>
             </a:r>
           </a:p>
           <a:p>
@@ -9845,7 +9813,7 @@
     </p:spTree>
     <p:extLst>
       <p:ext uri="{BB962C8B-B14F-4D97-AF65-F5344CB8AC3E}">
-        <p14:creationId xmlns:p14="http://schemas.microsoft.com/office/powerpoint/2010/main" val="1147437722"/>
+        <p14:creationId xmlns:p14="http://schemas.microsoft.com/office/powerpoint/2010/main" val="1109056329"/>
       </p:ext>
     </p:extLst>
   </p:cSld>
@@ -9895,7 +9863,7 @@
           <a:p>
             <a:r>
               <a:rPr lang="en-US" dirty="0"/>
-              <a:t>Refining Data</a:t>
+              <a:t>Data Cleansing Operations</a:t>
             </a:r>
           </a:p>
         </p:txBody>
@@ -9923,33 +9891,74 @@
           <a:p>
             <a:r>
               <a:rPr lang="en-US" dirty="0"/>
-              <a:t>“Refined” data:  useful for querying and analysis</a:t>
-            </a:r>
-          </a:p>
-          <a:p>
-            <a:r>
-              <a:rPr lang="en-US" dirty="0"/>
-              <a:t>Known good data—or at least as good as possible!</a:t>
-            </a:r>
-          </a:p>
-          <a:p>
-            <a:r>
-              <a:rPr lang="en-US" dirty="0"/>
-              <a:t>Data linked together in meaningful ways—lookups, joins, etc. already done</a:t>
-            </a:r>
-          </a:p>
-          <a:p>
-            <a:r>
-              <a:rPr lang="en-US" dirty="0"/>
-              <a:t>Ideally, one file contains sufficient information for a query—we aren’t normalizing data here!</a:t>
-            </a:r>
+              <a:t>Don’t forget data issues!</a:t>
+            </a:r>
+          </a:p>
+          <a:p>
+            <a:pPr lvl="1"/>
+            <a:r>
+              <a:rPr lang="en-US" dirty="0"/>
+              <a:t>Impossible values (e.g., age &gt; 200, salary &lt; 0)</a:t>
+            </a:r>
+          </a:p>
+          <a:p>
+            <a:pPr lvl="1"/>
+            <a:r>
+              <a:rPr lang="en-US" dirty="0"/>
+              <a:t>Mismatched values (e.g., X in system 1, Y in system 2)</a:t>
+            </a:r>
+          </a:p>
+          <a:p>
+            <a:pPr lvl="1"/>
+            <a:r>
+              <a:rPr lang="en-US" dirty="0"/>
+              <a:t>Inaccurate data (e.g., need legal name but sent nickname)</a:t>
+            </a:r>
+          </a:p>
+          <a:p>
+            <a:pPr lvl="1"/>
+            <a:r>
+              <a:rPr lang="en-US" dirty="0"/>
+              <a:t>Duplicate data</a:t>
+            </a:r>
+          </a:p>
+          <a:p>
+            <a:pPr lvl="1"/>
+            <a:r>
+              <a:rPr lang="en-US" dirty="0"/>
+              <a:t>Misspellings</a:t>
+            </a:r>
+          </a:p>
+          <a:p>
+            <a:pPr lvl="1"/>
+            <a:r>
+              <a:rPr lang="en-US" dirty="0"/>
+              <a:t>Old data mixed with current (e.g., FLA and MIA Marlins)</a:t>
+            </a:r>
+          </a:p>
+          <a:p>
+            <a:pPr lvl="1"/>
+            <a:r>
+              <a:rPr lang="en-US" dirty="0"/>
+              <a:t>Impute or calculate missing values</a:t>
+            </a:r>
+          </a:p>
+          <a:p>
+            <a:r>
+              <a:rPr lang="en-US" dirty="0"/>
+              <a:t>Reminder:  fix data issues as early as possible, where you have the most information</a:t>
+            </a:r>
+          </a:p>
+          <a:p>
+            <a:pPr lvl="1"/>
+            <a:endParaRPr lang="en-US" dirty="0"/>
           </a:p>
         </p:txBody>
       </p:sp>
     </p:spTree>
     <p:extLst>
       <p:ext uri="{BB962C8B-B14F-4D97-AF65-F5344CB8AC3E}">
-        <p14:creationId xmlns:p14="http://schemas.microsoft.com/office/powerpoint/2010/main" val="1482961279"/>
+        <p14:creationId xmlns:p14="http://schemas.microsoft.com/office/powerpoint/2010/main" val="1147437722"/>
       </p:ext>
     </p:extLst>
   </p:cSld>
@@ -9999,7 +10008,7 @@
           <a:p>
             <a:r>
               <a:rPr lang="en-US" dirty="0"/>
-              <a:t>Curating Data</a:t>
+              <a:t>Refining Data</a:t>
             </a:r>
           </a:p>
         </p:txBody>
@@ -10027,25 +10036,25 @@
           <a:p>
             <a:r>
               <a:rPr lang="en-US" dirty="0"/>
-              <a:t>“Curated” data:  ready for reporting tools</a:t>
-            </a:r>
-          </a:p>
-          <a:p>
-            <a:r>
-              <a:rPr lang="en-US" dirty="0"/>
-              <a:t>Additional measures created:  new aggregates or calculations</a:t>
-            </a:r>
-          </a:p>
-          <a:p>
-            <a:r>
-              <a:rPr lang="en-US" dirty="0"/>
-              <a:t>Aggregates pre-calculated to make loading faster</a:t>
-            </a:r>
-          </a:p>
-          <a:p>
-            <a:r>
-              <a:rPr lang="en-US" dirty="0"/>
-              <a:t>Data shaped in a way which makes it easy for tools like Power BI to load</a:t>
+              <a:t>“Refined” data:  useful for querying and analysis</a:t>
+            </a:r>
+          </a:p>
+          <a:p>
+            <a:r>
+              <a:rPr lang="en-US" dirty="0"/>
+              <a:t>Known good data—or at least as good as possible!</a:t>
+            </a:r>
+          </a:p>
+          <a:p>
+            <a:r>
+              <a:rPr lang="en-US" dirty="0"/>
+              <a:t>Data linked together in meaningful ways—lookups, joins, etc. already done</a:t>
+            </a:r>
+          </a:p>
+          <a:p>
+            <a:r>
+              <a:rPr lang="en-US" dirty="0"/>
+              <a:t>Ideally, one file contains sufficient information for a query—we aren’t normalizing data here!</a:t>
             </a:r>
           </a:p>
         </p:txBody>
@@ -10053,7 +10062,7 @@
     </p:spTree>
     <p:extLst>
       <p:ext uri="{BB962C8B-B14F-4D97-AF65-F5344CB8AC3E}">
-        <p14:creationId xmlns:p14="http://schemas.microsoft.com/office/powerpoint/2010/main" val="2608317051"/>
+        <p14:creationId xmlns:p14="http://schemas.microsoft.com/office/powerpoint/2010/main" val="1482961279"/>
       </p:ext>
     </p:extLst>
   </p:cSld>
@@ -10103,7 +10112,7 @@
           <a:p>
             <a:r>
               <a:rPr lang="en-US" dirty="0"/>
-              <a:t>Making Data Accessible</a:t>
+              <a:t>Curating Data</a:t>
             </a:r>
           </a:p>
         </p:txBody>
@@ -10131,61 +10140,25 @@
           <a:p>
             <a:r>
               <a:rPr lang="en-US" dirty="0"/>
-              <a:t>Security</a:t>
-            </a:r>
-          </a:p>
-          <a:p>
-            <a:pPr lvl="1"/>
-            <a:r>
-              <a:rPr lang="en-US" dirty="0"/>
-              <a:t>Storage Blob Data Contributor</a:t>
-            </a:r>
-          </a:p>
-          <a:p>
-            <a:pPr lvl="1"/>
-            <a:r>
-              <a:rPr lang="en-US" dirty="0"/>
-              <a:t>Can lock down Raw data to data engineers—end users don’t need to see this</a:t>
-            </a:r>
-          </a:p>
-          <a:p>
-            <a:pPr lvl="1"/>
-            <a:r>
-              <a:rPr lang="en-US" dirty="0"/>
-              <a:t>Refined should be accessible to analysts</a:t>
-            </a:r>
-          </a:p>
-          <a:p>
-            <a:pPr lvl="1"/>
-            <a:r>
-              <a:rPr lang="en-US" dirty="0"/>
-              <a:t>Curated should be accessible to end users and reporting tools</a:t>
-            </a:r>
-          </a:p>
-          <a:p>
-            <a:r>
-              <a:rPr lang="en-US" dirty="0"/>
-              <a:t>Consistency</a:t>
-            </a:r>
-          </a:p>
-          <a:p>
-            <a:pPr lvl="1"/>
-            <a:r>
-              <a:rPr lang="en-US" dirty="0"/>
-              <a:t>Scheme consistency:  as common a folder structure as is reasonable</a:t>
-            </a:r>
-          </a:p>
-          <a:p>
-            <a:pPr lvl="1"/>
-            <a:r>
-              <a:rPr lang="en-US" dirty="0"/>
-              <a:t>Format consistency:  Parquet for stored files</a:t>
-            </a:r>
-          </a:p>
-          <a:p>
-            <a:r>
-              <a:rPr lang="en-US" dirty="0"/>
-              <a:t>Few stops—ensure users don’t need to join multiple folders together to get basic work done</a:t>
+              <a:t>“Curated” data:  ready for reporting tools</a:t>
+            </a:r>
+          </a:p>
+          <a:p>
+            <a:r>
+              <a:rPr lang="en-US" dirty="0"/>
+              <a:t>Additional measures created:  new aggregates or calculations</a:t>
+            </a:r>
+          </a:p>
+          <a:p>
+            <a:r>
+              <a:rPr lang="en-US" dirty="0"/>
+              <a:t>Aggregates pre-calculated to make loading faster</a:t>
+            </a:r>
+          </a:p>
+          <a:p>
+            <a:r>
+              <a:rPr lang="en-US" dirty="0"/>
+              <a:t>Data shaped in a way which makes it easy for tools like Power BI to load</a:t>
             </a:r>
           </a:p>
         </p:txBody>
@@ -10193,7 +10166,7 @@
     </p:spTree>
     <p:extLst>
       <p:ext uri="{BB962C8B-B14F-4D97-AF65-F5344CB8AC3E}">
-        <p14:creationId xmlns:p14="http://schemas.microsoft.com/office/powerpoint/2010/main" val="3453720110"/>
+        <p14:creationId xmlns:p14="http://schemas.microsoft.com/office/powerpoint/2010/main" val="2608317051"/>
       </p:ext>
     </p:extLst>
   </p:cSld>
@@ -10225,6 +10198,146 @@
           <p:cNvPr id="2" name="Title 1">
             <a:extLst>
               <a:ext uri="{FF2B5EF4-FFF2-40B4-BE49-F238E27FC236}">
+                <a16:creationId xmlns:a16="http://schemas.microsoft.com/office/drawing/2014/main" id="{B22C245E-2B4F-FD50-59A0-517F533BEB13}"/>
+              </a:ext>
+            </a:extLst>
+          </p:cNvPr>
+          <p:cNvSpPr>
+            <a:spLocks noGrp="1"/>
+          </p:cNvSpPr>
+          <p:nvPr>
+            <p:ph type="title"/>
+          </p:nvPr>
+        </p:nvSpPr>
+        <p:spPr/>
+        <p:txBody>
+          <a:bodyPr/>
+          <a:lstStyle/>
+          <a:p>
+            <a:r>
+              <a:rPr lang="en-US" dirty="0"/>
+              <a:t>Making Data Accessible</a:t>
+            </a:r>
+          </a:p>
+        </p:txBody>
+      </p:sp>
+      <p:sp>
+        <p:nvSpPr>
+          <p:cNvPr id="3" name="Content Placeholder 2">
+            <a:extLst>
+              <a:ext uri="{FF2B5EF4-FFF2-40B4-BE49-F238E27FC236}">
+                <a16:creationId xmlns:a16="http://schemas.microsoft.com/office/drawing/2014/main" id="{566CAAAE-75F3-7B5E-C61A-03FF68C88573}"/>
+              </a:ext>
+            </a:extLst>
+          </p:cNvPr>
+          <p:cNvSpPr>
+            <a:spLocks noGrp="1"/>
+          </p:cNvSpPr>
+          <p:nvPr>
+            <p:ph idx="1"/>
+          </p:nvPr>
+        </p:nvSpPr>
+        <p:spPr/>
+        <p:txBody>
+          <a:bodyPr/>
+          <a:lstStyle/>
+          <a:p>
+            <a:r>
+              <a:rPr lang="en-US" dirty="0"/>
+              <a:t>Security</a:t>
+            </a:r>
+          </a:p>
+          <a:p>
+            <a:pPr lvl="1"/>
+            <a:r>
+              <a:rPr lang="en-US" dirty="0"/>
+              <a:t>Storage Blob Data Contributor</a:t>
+            </a:r>
+          </a:p>
+          <a:p>
+            <a:pPr lvl="1"/>
+            <a:r>
+              <a:rPr lang="en-US" dirty="0"/>
+              <a:t>Can lock down Raw data to data engineers—end users don’t need to see this</a:t>
+            </a:r>
+          </a:p>
+          <a:p>
+            <a:pPr lvl="1"/>
+            <a:r>
+              <a:rPr lang="en-US" dirty="0"/>
+              <a:t>Refined should be accessible to analysts</a:t>
+            </a:r>
+          </a:p>
+          <a:p>
+            <a:pPr lvl="1"/>
+            <a:r>
+              <a:rPr lang="en-US" dirty="0"/>
+              <a:t>Curated should be accessible to end users and reporting tools</a:t>
+            </a:r>
+          </a:p>
+          <a:p>
+            <a:r>
+              <a:rPr lang="en-US" dirty="0"/>
+              <a:t>Consistency</a:t>
+            </a:r>
+          </a:p>
+          <a:p>
+            <a:pPr lvl="1"/>
+            <a:r>
+              <a:rPr lang="en-US" dirty="0"/>
+              <a:t>Scheme consistency:  as common a folder structure as is reasonable</a:t>
+            </a:r>
+          </a:p>
+          <a:p>
+            <a:pPr lvl="1"/>
+            <a:r>
+              <a:rPr lang="en-US" dirty="0"/>
+              <a:t>Format consistency:  Parquet for stored files</a:t>
+            </a:r>
+          </a:p>
+          <a:p>
+            <a:r>
+              <a:rPr lang="en-US" dirty="0"/>
+              <a:t>Few stops—ensure users don’t need to join multiple folders together to get basic work done</a:t>
+            </a:r>
+          </a:p>
+        </p:txBody>
+      </p:sp>
+    </p:spTree>
+    <p:extLst>
+      <p:ext uri="{BB962C8B-B14F-4D97-AF65-F5344CB8AC3E}">
+        <p14:creationId xmlns:p14="http://schemas.microsoft.com/office/powerpoint/2010/main" val="3453720110"/>
+      </p:ext>
+    </p:extLst>
+  </p:cSld>
+  <p:clrMapOvr>
+    <a:masterClrMapping/>
+  </p:clrMapOvr>
+</p:sld>
+</file>
+
+<file path=ppt/slides/slide58.xml><?xml version="1.0" encoding="utf-8"?>
+<p:sld xmlns:a="http://schemas.openxmlformats.org/drawingml/2006/main" xmlns:r="http://schemas.openxmlformats.org/officeDocument/2006/relationships" xmlns:p="http://schemas.openxmlformats.org/presentationml/2006/main">
+  <p:cSld>
+    <p:spTree>
+      <p:nvGrpSpPr>
+        <p:cNvPr id="1" name=""/>
+        <p:cNvGrpSpPr/>
+        <p:nvPr/>
+      </p:nvGrpSpPr>
+      <p:grpSpPr>
+        <a:xfrm>
+          <a:off x="0" y="0"/>
+          <a:ext cx="0" cy="0"/>
+          <a:chOff x="0" y="0"/>
+          <a:chExt cx="0" cy="0"/>
+        </a:xfrm>
+      </p:grpSpPr>
+      <p:sp>
+        <p:nvSpPr>
+          <p:cNvPr id="2" name="Title 1">
+            <a:extLst>
+              <a:ext uri="{FF2B5EF4-FFF2-40B4-BE49-F238E27FC236}">
                 <a16:creationId xmlns:a16="http://schemas.microsoft.com/office/drawing/2014/main" id="{EC13CA8F-1BA1-8E30-EC44-4ECC2E6CADBF}"/>
               </a:ext>
             </a:extLst>
@@ -10286,7 +10399,7 @@
 </p:sld>
 </file>
 
-<file path=ppt/slides/slide58.xml><?xml version="1.0" encoding="utf-8"?>
+<file path=ppt/slides/slide59.xml><?xml version="1.0" encoding="utf-8"?>
 <p:sld xmlns:a="http://schemas.openxmlformats.org/drawingml/2006/main" xmlns:r="http://schemas.openxmlformats.org/officeDocument/2006/relationships" xmlns:p="http://schemas.openxmlformats.org/presentationml/2006/main">
   <p:cSld>
     <p:spTree>
@@ -10408,7 +10521,99 @@
 </p:sld>
 </file>
 
-<file path=ppt/slides/slide59.xml><?xml version="1.0" encoding="utf-8"?>
+<file path=ppt/slides/slide6.xml><?xml version="1.0" encoding="utf-8"?>
+<p:sld xmlns:a="http://schemas.openxmlformats.org/drawingml/2006/main" xmlns:r="http://schemas.openxmlformats.org/officeDocument/2006/relationships" xmlns:p="http://schemas.openxmlformats.org/presentationml/2006/main">
+  <p:cSld>
+    <p:spTree>
+      <p:nvGrpSpPr>
+        <p:cNvPr id="1" name=""/>
+        <p:cNvGrpSpPr/>
+        <p:nvPr/>
+      </p:nvGrpSpPr>
+      <p:grpSpPr>
+        <a:xfrm>
+          <a:off x="0" y="0"/>
+          <a:ext cx="0" cy="0"/>
+          <a:chOff x="0" y="0"/>
+          <a:chExt cx="0" cy="0"/>
+        </a:xfrm>
+      </p:grpSpPr>
+      <p:sp>
+        <p:nvSpPr>
+          <p:cNvPr id="2" name="Title 1">
+            <a:extLst>
+              <a:ext uri="{FF2B5EF4-FFF2-40B4-BE49-F238E27FC236}">
+                <a16:creationId xmlns:a16="http://schemas.microsoft.com/office/drawing/2014/main" id="{5C03EE32-2A13-115F-BEB7-AD9AB8093D16}"/>
+              </a:ext>
+            </a:extLst>
+          </p:cNvPr>
+          <p:cNvSpPr>
+            <a:spLocks noGrp="1"/>
+          </p:cNvSpPr>
+          <p:nvPr>
+            <p:ph type="title"/>
+          </p:nvPr>
+        </p:nvSpPr>
+        <p:spPr/>
+        <p:txBody>
+          <a:bodyPr/>
+          <a:lstStyle/>
+          <a:p>
+            <a:r>
+              <a:rPr lang="en-US" dirty="0"/>
+              <a:t>Synapse Pipelines</a:t>
+            </a:r>
+          </a:p>
+        </p:txBody>
+      </p:sp>
+      <p:sp>
+        <p:nvSpPr>
+          <p:cNvPr id="3" name="Content Placeholder 2">
+            <a:extLst>
+              <a:ext uri="{FF2B5EF4-FFF2-40B4-BE49-F238E27FC236}">
+                <a16:creationId xmlns:a16="http://schemas.microsoft.com/office/drawing/2014/main" id="{EE85CFCF-CBC7-F7A0-6088-160B54357F17}"/>
+              </a:ext>
+            </a:extLst>
+          </p:cNvPr>
+          <p:cNvSpPr>
+            <a:spLocks noGrp="1"/>
+          </p:cNvSpPr>
+          <p:nvPr>
+            <p:ph idx="1"/>
+          </p:nvPr>
+        </p:nvSpPr>
+        <p:spPr/>
+        <p:txBody>
+          <a:bodyPr/>
+          <a:lstStyle/>
+          <a:p>
+            <a:r>
+              <a:rPr lang="en-US" dirty="0"/>
+              <a:t>Based on Azure Data Factory code base</a:t>
+            </a:r>
+          </a:p>
+          <a:p>
+            <a:r>
+              <a:rPr lang="en-US" dirty="0"/>
+              <a:t>Works best for ELT, sometimes for ETL</a:t>
+            </a:r>
+          </a:p>
+        </p:txBody>
+      </p:sp>
+    </p:spTree>
+    <p:extLst>
+      <p:ext uri="{BB962C8B-B14F-4D97-AF65-F5344CB8AC3E}">
+        <p14:creationId xmlns:p14="http://schemas.microsoft.com/office/powerpoint/2010/main" val="448488041"/>
+      </p:ext>
+    </p:extLst>
+  </p:cSld>
+  <p:clrMapOvr>
+    <a:masterClrMapping/>
+  </p:clrMapOvr>
+</p:sld>
+</file>
+
+<file path=ppt/slides/slide60.xml><?xml version="1.0" encoding="utf-8"?>
 <p:sld xmlns:a="http://schemas.openxmlformats.org/drawingml/2006/main" xmlns:r="http://schemas.openxmlformats.org/officeDocument/2006/relationships" xmlns:p="http://schemas.openxmlformats.org/presentationml/2006/main">
   <p:cSld>
     <p:spTree>
@@ -10535,99 +10740,7 @@
 </p:sld>
 </file>
 
-<file path=ppt/slides/slide6.xml><?xml version="1.0" encoding="utf-8"?>
-<p:sld xmlns:a="http://schemas.openxmlformats.org/drawingml/2006/main" xmlns:r="http://schemas.openxmlformats.org/officeDocument/2006/relationships" xmlns:p="http://schemas.openxmlformats.org/presentationml/2006/main">
-  <p:cSld>
-    <p:spTree>
-      <p:nvGrpSpPr>
-        <p:cNvPr id="1" name=""/>
-        <p:cNvGrpSpPr/>
-        <p:nvPr/>
-      </p:nvGrpSpPr>
-      <p:grpSpPr>
-        <a:xfrm>
-          <a:off x="0" y="0"/>
-          <a:ext cx="0" cy="0"/>
-          <a:chOff x="0" y="0"/>
-          <a:chExt cx="0" cy="0"/>
-        </a:xfrm>
-      </p:grpSpPr>
-      <p:sp>
-        <p:nvSpPr>
-          <p:cNvPr id="2" name="Title 1">
-            <a:extLst>
-              <a:ext uri="{FF2B5EF4-FFF2-40B4-BE49-F238E27FC236}">
-                <a16:creationId xmlns:a16="http://schemas.microsoft.com/office/drawing/2014/main" id="{5C03EE32-2A13-115F-BEB7-AD9AB8093D16}"/>
-              </a:ext>
-            </a:extLst>
-          </p:cNvPr>
-          <p:cNvSpPr>
-            <a:spLocks noGrp="1"/>
-          </p:cNvSpPr>
-          <p:nvPr>
-            <p:ph type="title"/>
-          </p:nvPr>
-        </p:nvSpPr>
-        <p:spPr/>
-        <p:txBody>
-          <a:bodyPr/>
-          <a:lstStyle/>
-          <a:p>
-            <a:r>
-              <a:rPr lang="en-US" dirty="0"/>
-              <a:t>Synapse Pipelines</a:t>
-            </a:r>
-          </a:p>
-        </p:txBody>
-      </p:sp>
-      <p:sp>
-        <p:nvSpPr>
-          <p:cNvPr id="3" name="Content Placeholder 2">
-            <a:extLst>
-              <a:ext uri="{FF2B5EF4-FFF2-40B4-BE49-F238E27FC236}">
-                <a16:creationId xmlns:a16="http://schemas.microsoft.com/office/drawing/2014/main" id="{EE85CFCF-CBC7-F7A0-6088-160B54357F17}"/>
-              </a:ext>
-            </a:extLst>
-          </p:cNvPr>
-          <p:cNvSpPr>
-            <a:spLocks noGrp="1"/>
-          </p:cNvSpPr>
-          <p:nvPr>
-            <p:ph idx="1"/>
-          </p:nvPr>
-        </p:nvSpPr>
-        <p:spPr/>
-        <p:txBody>
-          <a:bodyPr/>
-          <a:lstStyle/>
-          <a:p>
-            <a:r>
-              <a:rPr lang="en-US" dirty="0"/>
-              <a:t>Based on Azure Data Factory code base</a:t>
-            </a:r>
-          </a:p>
-          <a:p>
-            <a:r>
-              <a:rPr lang="en-US" dirty="0"/>
-              <a:t>Works best for ELT, sometimes for ETL</a:t>
-            </a:r>
-          </a:p>
-        </p:txBody>
-      </p:sp>
-    </p:spTree>
-    <p:extLst>
-      <p:ext uri="{BB962C8B-B14F-4D97-AF65-F5344CB8AC3E}">
-        <p14:creationId xmlns:p14="http://schemas.microsoft.com/office/powerpoint/2010/main" val="448488041"/>
-      </p:ext>
-    </p:extLst>
-  </p:cSld>
-  <p:clrMapOvr>
-    <a:masterClrMapping/>
-  </p:clrMapOvr>
-</p:sld>
-</file>
-
-<file path=ppt/slides/slide60.xml><?xml version="1.0" encoding="utf-8"?>
+<file path=ppt/slides/slide61.xml><?xml version="1.0" encoding="utf-8"?>
 <p:sld xmlns:a="http://schemas.openxmlformats.org/drawingml/2006/main" xmlns:r="http://schemas.openxmlformats.org/officeDocument/2006/relationships" xmlns:p="http://schemas.openxmlformats.org/presentationml/2006/main">
   <p:cSld>
     <p:spTree>
@@ -10750,110 +10863,6 @@
 </p:sld>
 </file>
 
-<file path=ppt/slides/slide61.xml><?xml version="1.0" encoding="utf-8"?>
-<p:sld xmlns:a="http://schemas.openxmlformats.org/drawingml/2006/main" xmlns:r="http://schemas.openxmlformats.org/officeDocument/2006/relationships" xmlns:p="http://schemas.openxmlformats.org/presentationml/2006/main">
-  <p:cSld>
-    <p:spTree>
-      <p:nvGrpSpPr>
-        <p:cNvPr id="1" name=""/>
-        <p:cNvGrpSpPr/>
-        <p:nvPr/>
-      </p:nvGrpSpPr>
-      <p:grpSpPr>
-        <a:xfrm>
-          <a:off x="0" y="0"/>
-          <a:ext cx="0" cy="0"/>
-          <a:chOff x="0" y="0"/>
-          <a:chExt cx="0" cy="0"/>
-        </a:xfrm>
-      </p:grpSpPr>
-      <p:sp>
-        <p:nvSpPr>
-          <p:cNvPr id="2" name="Title 1">
-            <a:extLst>
-              <a:ext uri="{FF2B5EF4-FFF2-40B4-BE49-F238E27FC236}">
-                <a16:creationId xmlns:a16="http://schemas.microsoft.com/office/drawing/2014/main" id="{B22C245E-2B4F-FD50-59A0-517F533BEB13}"/>
-              </a:ext>
-            </a:extLst>
-          </p:cNvPr>
-          <p:cNvSpPr>
-            <a:spLocks noGrp="1"/>
-          </p:cNvSpPr>
-          <p:nvPr>
-            <p:ph type="title"/>
-          </p:nvPr>
-        </p:nvSpPr>
-        <p:spPr/>
-        <p:txBody>
-          <a:bodyPr/>
-          <a:lstStyle/>
-          <a:p>
-            <a:r>
-              <a:rPr lang="en-US" dirty="0"/>
-              <a:t>Lab Part 2</a:t>
-            </a:r>
-          </a:p>
-        </p:txBody>
-      </p:sp>
-      <p:sp>
-        <p:nvSpPr>
-          <p:cNvPr id="3" name="Content Placeholder 2">
-            <a:extLst>
-              <a:ext uri="{FF2B5EF4-FFF2-40B4-BE49-F238E27FC236}">
-                <a16:creationId xmlns:a16="http://schemas.microsoft.com/office/drawing/2014/main" id="{566CAAAE-75F3-7B5E-C61A-03FF68C88573}"/>
-              </a:ext>
-            </a:extLst>
-          </p:cNvPr>
-          <p:cNvSpPr>
-            <a:spLocks noGrp="1"/>
-          </p:cNvSpPr>
-          <p:nvPr>
-            <p:ph idx="1"/>
-          </p:nvPr>
-        </p:nvSpPr>
-        <p:spPr/>
-        <p:txBody>
-          <a:bodyPr/>
-          <a:lstStyle/>
-          <a:p>
-            <a:r>
-              <a:rPr lang="en-US" dirty="0"/>
-              <a:t>Read data from the data lake</a:t>
-            </a:r>
-          </a:p>
-          <a:p>
-            <a:r>
-              <a:rPr lang="en-US" dirty="0"/>
-              <a:t>Process data with Python and Spark SQL</a:t>
-            </a:r>
-          </a:p>
-          <a:p>
-            <a:r>
-              <a:rPr lang="en-US" dirty="0"/>
-              <a:t>Perform basic machine learning with Python</a:t>
-            </a:r>
-          </a:p>
-          <a:p>
-            <a:r>
-              <a:rPr lang="en-US" dirty="0"/>
-              <a:t>Write results to the data lake</a:t>
-            </a:r>
-          </a:p>
-        </p:txBody>
-      </p:sp>
-    </p:spTree>
-    <p:extLst>
-      <p:ext uri="{BB962C8B-B14F-4D97-AF65-F5344CB8AC3E}">
-        <p14:creationId xmlns:p14="http://schemas.microsoft.com/office/powerpoint/2010/main" val="3738787417"/>
-      </p:ext>
-    </p:extLst>
-  </p:cSld>
-  <p:clrMapOvr>
-    <a:masterClrMapping/>
-  </p:clrMapOvr>
-</p:sld>
-</file>
-
 <file path=ppt/slides/slide62.xml><?xml version="1.0" encoding="utf-8"?>
 <p:sld xmlns:a="http://schemas.openxmlformats.org/drawingml/2006/main" xmlns:r="http://schemas.openxmlformats.org/officeDocument/2006/relationships" xmlns:p="http://schemas.openxmlformats.org/presentationml/2006/main">
   <p:cSld>
@@ -10876,7 +10885,7 @@
           <p:cNvPr id="2" name="Title 1">
             <a:extLst>
               <a:ext uri="{FF2B5EF4-FFF2-40B4-BE49-F238E27FC236}">
-                <a16:creationId xmlns:a16="http://schemas.microsoft.com/office/drawing/2014/main" id="{EC13CA8F-1BA1-8E30-EC44-4ECC2E6CADBF}"/>
+                <a16:creationId xmlns:a16="http://schemas.microsoft.com/office/drawing/2014/main" id="{B22C245E-2B4F-FD50-59A0-517F533BEB13}"/>
               </a:ext>
             </a:extLst>
           </p:cNvPr>
@@ -10894,17 +10903,17 @@
           <a:p>
             <a:r>
               <a:rPr lang="en-US" dirty="0"/>
-              <a:t>Synapse Pipelines</a:t>
-            </a:r>
-          </a:p>
-        </p:txBody>
-      </p:sp>
-      <p:sp>
-        <p:nvSpPr>
-          <p:cNvPr id="3" name="Text Placeholder 2">
-            <a:extLst>
-              <a:ext uri="{FF2B5EF4-FFF2-40B4-BE49-F238E27FC236}">
-                <a16:creationId xmlns:a16="http://schemas.microsoft.com/office/drawing/2014/main" id="{01CE36E8-5BB2-8735-36ED-2830E523ACB3}"/>
+              <a:t>Lab Part 2</a:t>
+            </a:r>
+          </a:p>
+        </p:txBody>
+      </p:sp>
+      <p:sp>
+        <p:nvSpPr>
+          <p:cNvPr id="3" name="Content Placeholder 2">
+            <a:extLst>
+              <a:ext uri="{FF2B5EF4-FFF2-40B4-BE49-F238E27FC236}">
+                <a16:creationId xmlns:a16="http://schemas.microsoft.com/office/drawing/2014/main" id="{566CAAAE-75F3-7B5E-C61A-03FF68C88573}"/>
               </a:ext>
             </a:extLst>
           </p:cNvPr>
@@ -10912,7 +10921,7 @@
             <a:spLocks noGrp="1"/>
           </p:cNvSpPr>
           <p:nvPr>
-            <p:ph type="body" idx="1"/>
+            <p:ph idx="1"/>
           </p:nvPr>
         </p:nvSpPr>
         <p:spPr/>
@@ -10920,14 +10929,35 @@
           <a:bodyPr/>
           <a:lstStyle/>
           <a:p>
-            <a:endParaRPr lang="en-US"/>
+            <a:r>
+              <a:rPr lang="en-US" dirty="0"/>
+              <a:t>Read data from the data lake</a:t>
+            </a:r>
+          </a:p>
+          <a:p>
+            <a:r>
+              <a:rPr lang="en-US" dirty="0"/>
+              <a:t>Process data with Python and Spark SQL</a:t>
+            </a:r>
+          </a:p>
+          <a:p>
+            <a:r>
+              <a:rPr lang="en-US" dirty="0"/>
+              <a:t>Perform basic machine learning with Python</a:t>
+            </a:r>
+          </a:p>
+          <a:p>
+            <a:r>
+              <a:rPr lang="en-US" dirty="0"/>
+              <a:t>Write results to the data lake</a:t>
+            </a:r>
           </a:p>
         </p:txBody>
       </p:sp>
     </p:spTree>
     <p:extLst>
       <p:ext uri="{BB962C8B-B14F-4D97-AF65-F5344CB8AC3E}">
-        <p14:creationId xmlns:p14="http://schemas.microsoft.com/office/powerpoint/2010/main" val="3473337278"/>
+        <p14:creationId xmlns:p14="http://schemas.microsoft.com/office/powerpoint/2010/main" val="3738787417"/>
       </p:ext>
     </p:extLst>
   </p:cSld>
@@ -10959,6 +10989,89 @@
           <p:cNvPr id="2" name="Title 1">
             <a:extLst>
               <a:ext uri="{FF2B5EF4-FFF2-40B4-BE49-F238E27FC236}">
+                <a16:creationId xmlns:a16="http://schemas.microsoft.com/office/drawing/2014/main" id="{EC13CA8F-1BA1-8E30-EC44-4ECC2E6CADBF}"/>
+              </a:ext>
+            </a:extLst>
+          </p:cNvPr>
+          <p:cNvSpPr>
+            <a:spLocks noGrp="1"/>
+          </p:cNvSpPr>
+          <p:nvPr>
+            <p:ph type="title"/>
+          </p:nvPr>
+        </p:nvSpPr>
+        <p:spPr/>
+        <p:txBody>
+          <a:bodyPr/>
+          <a:lstStyle/>
+          <a:p>
+            <a:r>
+              <a:rPr lang="en-US" dirty="0"/>
+              <a:t>Synapse Pipelines</a:t>
+            </a:r>
+          </a:p>
+        </p:txBody>
+      </p:sp>
+      <p:sp>
+        <p:nvSpPr>
+          <p:cNvPr id="3" name="Text Placeholder 2">
+            <a:extLst>
+              <a:ext uri="{FF2B5EF4-FFF2-40B4-BE49-F238E27FC236}">
+                <a16:creationId xmlns:a16="http://schemas.microsoft.com/office/drawing/2014/main" id="{01CE36E8-5BB2-8735-36ED-2830E523ACB3}"/>
+              </a:ext>
+            </a:extLst>
+          </p:cNvPr>
+          <p:cNvSpPr>
+            <a:spLocks noGrp="1"/>
+          </p:cNvSpPr>
+          <p:nvPr>
+            <p:ph type="body" idx="1"/>
+          </p:nvPr>
+        </p:nvSpPr>
+        <p:spPr/>
+        <p:txBody>
+          <a:bodyPr/>
+          <a:lstStyle/>
+          <a:p>
+            <a:endParaRPr lang="en-US"/>
+          </a:p>
+        </p:txBody>
+      </p:sp>
+    </p:spTree>
+    <p:extLst>
+      <p:ext uri="{BB962C8B-B14F-4D97-AF65-F5344CB8AC3E}">
+        <p14:creationId xmlns:p14="http://schemas.microsoft.com/office/powerpoint/2010/main" val="3473337278"/>
+      </p:ext>
+    </p:extLst>
+  </p:cSld>
+  <p:clrMapOvr>
+    <a:masterClrMapping/>
+  </p:clrMapOvr>
+</p:sld>
+</file>
+
+<file path=ppt/slides/slide64.xml><?xml version="1.0" encoding="utf-8"?>
+<p:sld xmlns:a="http://schemas.openxmlformats.org/drawingml/2006/main" xmlns:r="http://schemas.openxmlformats.org/officeDocument/2006/relationships" xmlns:p="http://schemas.openxmlformats.org/presentationml/2006/main">
+  <p:cSld>
+    <p:spTree>
+      <p:nvGrpSpPr>
+        <p:cNvPr id="1" name=""/>
+        <p:cNvGrpSpPr/>
+        <p:nvPr/>
+      </p:nvGrpSpPr>
+      <p:grpSpPr>
+        <a:xfrm>
+          <a:off x="0" y="0"/>
+          <a:ext cx="0" cy="0"/>
+          <a:chOff x="0" y="0"/>
+          <a:chExt cx="0" cy="0"/>
+        </a:xfrm>
+      </p:grpSpPr>
+      <p:sp>
+        <p:nvSpPr>
+          <p:cNvPr id="2" name="Title 1">
+            <a:extLst>
+              <a:ext uri="{FF2B5EF4-FFF2-40B4-BE49-F238E27FC236}">
                 <a16:creationId xmlns:a16="http://schemas.microsoft.com/office/drawing/2014/main" id="{B22C245E-2B4F-FD50-59A0-517F533BEB13}"/>
               </a:ext>
             </a:extLst>
@@ -11069,7 +11182,7 @@
 </p:sld>
 </file>
 
-<file path=ppt/slides/slide64.xml><?xml version="1.0" encoding="utf-8"?>
+<file path=ppt/slides/slide65.xml><?xml version="1.0" encoding="utf-8"?>
 <p:sld xmlns:a="http://schemas.openxmlformats.org/drawingml/2006/main" xmlns:r="http://schemas.openxmlformats.org/officeDocument/2006/relationships" xmlns:p="http://schemas.openxmlformats.org/presentationml/2006/main">
   <p:cSld>
     <p:spTree>
@@ -11156,7 +11269,7 @@
 </p:sld>
 </file>
 
-<file path=ppt/slides/slide65.xml><?xml version="1.0" encoding="utf-8"?>
+<file path=ppt/slides/slide66.xml><?xml version="1.0" encoding="utf-8"?>
 <p:sld xmlns:a="http://schemas.openxmlformats.org/drawingml/2006/main" xmlns:r="http://schemas.openxmlformats.org/officeDocument/2006/relationships" xmlns:p="http://schemas.openxmlformats.org/presentationml/2006/main">
   <p:cSld>
     <p:spTree>
@@ -12148,7 +12261,7 @@
 </p:sld>
 </file>
 
-<file path=ppt/slides/slide66.xml><?xml version="1.0" encoding="utf-8"?>
+<file path=ppt/slides/slide67.xml><?xml version="1.0" encoding="utf-8"?>
 <p:sld xmlns:a="http://schemas.openxmlformats.org/drawingml/2006/main" xmlns:r="http://schemas.openxmlformats.org/officeDocument/2006/relationships" xmlns:p="http://schemas.openxmlformats.org/presentationml/2006/main">
   <p:cSld>
     <p:spTree>
@@ -18465,7 +18578,7 @@
 </p:sld>
 </file>
 
-<file path=ppt/slides/slide67.xml><?xml version="1.0" encoding="utf-8"?>
+<file path=ppt/slides/slide68.xml><?xml version="1.0" encoding="utf-8"?>
 <p:sld xmlns:a="http://schemas.openxmlformats.org/drawingml/2006/main" xmlns:r="http://schemas.openxmlformats.org/officeDocument/2006/relationships" xmlns:p="http://schemas.openxmlformats.org/presentationml/2006/main">
   <p:cSld>
     <p:spTree>
@@ -18622,7 +18735,7 @@
 </p:sld>
 </file>
 
-<file path=ppt/slides/slide68.xml><?xml version="1.0" encoding="utf-8"?>
+<file path=ppt/slides/slide69.xml><?xml version="1.0" encoding="utf-8"?>
 <p:sld xmlns:a="http://schemas.openxmlformats.org/drawingml/2006/main" xmlns:r="http://schemas.openxmlformats.org/officeDocument/2006/relationships" xmlns:p="http://schemas.openxmlformats.org/presentationml/2006/main">
   <p:cSld>
     <p:spTree>
@@ -18773,7 +18886,141 @@
 </p:sld>
 </file>
 
-<file path=ppt/slides/slide69.xml><?xml version="1.0" encoding="utf-8"?>
+<file path=ppt/slides/slide7.xml><?xml version="1.0" encoding="utf-8"?>
+<p:sld xmlns:a="http://schemas.openxmlformats.org/drawingml/2006/main" xmlns:r="http://schemas.openxmlformats.org/officeDocument/2006/relationships" xmlns:p="http://schemas.openxmlformats.org/presentationml/2006/main">
+  <p:cSld>
+    <p:spTree>
+      <p:nvGrpSpPr>
+        <p:cNvPr id="1" name=""/>
+        <p:cNvGrpSpPr/>
+        <p:nvPr/>
+      </p:nvGrpSpPr>
+      <p:grpSpPr>
+        <a:xfrm>
+          <a:off x="0" y="0"/>
+          <a:ext cx="0" cy="0"/>
+          <a:chOff x="0" y="0"/>
+          <a:chExt cx="0" cy="0"/>
+        </a:xfrm>
+      </p:grpSpPr>
+      <p:sp>
+        <p:nvSpPr>
+          <p:cNvPr id="2" name="Title 1">
+            <a:extLst>
+              <a:ext uri="{FF2B5EF4-FFF2-40B4-BE49-F238E27FC236}">
+                <a16:creationId xmlns:a16="http://schemas.microsoft.com/office/drawing/2014/main" id="{AE4E9D02-F4B1-7DDD-4DA4-4FB21F80A804}"/>
+              </a:ext>
+            </a:extLst>
+          </p:cNvPr>
+          <p:cNvSpPr>
+            <a:spLocks noGrp="1"/>
+          </p:cNvSpPr>
+          <p:nvPr>
+            <p:ph type="title"/>
+          </p:nvPr>
+        </p:nvSpPr>
+        <p:spPr/>
+        <p:txBody>
+          <a:bodyPr/>
+          <a:lstStyle/>
+          <a:p>
+            <a:r>
+              <a:rPr lang="en-US" dirty="0"/>
+              <a:t>Where Is My Data?</a:t>
+            </a:r>
+          </a:p>
+        </p:txBody>
+      </p:sp>
+      <p:sp>
+        <p:nvSpPr>
+          <p:cNvPr id="3" name="Content Placeholder 2">
+            <a:extLst>
+              <a:ext uri="{FF2B5EF4-FFF2-40B4-BE49-F238E27FC236}">
+                <a16:creationId xmlns:a16="http://schemas.microsoft.com/office/drawing/2014/main" id="{AC869689-4A76-C95F-DF1B-1503917B22E1}"/>
+              </a:ext>
+            </a:extLst>
+          </p:cNvPr>
+          <p:cNvSpPr>
+            <a:spLocks noGrp="1"/>
+          </p:cNvSpPr>
+          <p:nvPr>
+            <p:ph idx="1"/>
+          </p:nvPr>
+        </p:nvSpPr>
+        <p:spPr/>
+        <p:txBody>
+          <a:bodyPr/>
+          <a:lstStyle/>
+          <a:p>
+            <a:r>
+              <a:rPr lang="en-US" dirty="0"/>
+              <a:t>Dedicated SQL pool</a:t>
+            </a:r>
+          </a:p>
+          <a:p>
+            <a:pPr lvl="1"/>
+            <a:r>
+              <a:rPr lang="en-US" dirty="0"/>
+              <a:t>Split into 60 distributions but can logically be considered together</a:t>
+            </a:r>
+          </a:p>
+          <a:p>
+            <a:pPr lvl="1"/>
+            <a:r>
+              <a:rPr lang="en-US" dirty="0"/>
+              <a:t>Closest thing to a “normal” database for SQL Server users, though plenty of differences</a:t>
+            </a:r>
+          </a:p>
+          <a:p>
+            <a:r>
+              <a:rPr lang="en-US" dirty="0"/>
+              <a:t>Data Lake</a:t>
+            </a:r>
+          </a:p>
+          <a:p>
+            <a:pPr lvl="1"/>
+            <a:r>
+              <a:rPr lang="en-US" dirty="0"/>
+              <a:t>Data files stored in Azure Data Lake Storage Gen2</a:t>
+            </a:r>
+          </a:p>
+          <a:p>
+            <a:pPr lvl="1"/>
+            <a:r>
+              <a:rPr lang="en-US" dirty="0"/>
+              <a:t>Typically follows a particular hierarchical breakdown:</a:t>
+            </a:r>
+            <a:br>
+              <a:rPr lang="en-US" dirty="0"/>
+            </a:br>
+            <a:r>
+              <a:rPr lang="en-US" dirty="0"/>
+              <a:t>Measure \ Year \ Month \ Day \ {Hour \ … }</a:t>
+            </a:r>
+          </a:p>
+          <a:p>
+            <a:pPr lvl="1"/>
+            <a:r>
+              <a:rPr lang="en-US" dirty="0"/>
+              <a:t>Data typically stored in quasi-structured formats:  CSV/delimited file, JSON, ORC, Parquet</a:t>
+            </a:r>
+          </a:p>
+        </p:txBody>
+      </p:sp>
+    </p:spTree>
+    <p:extLst>
+      <p:ext uri="{BB962C8B-B14F-4D97-AF65-F5344CB8AC3E}">
+        <p14:creationId xmlns:p14="http://schemas.microsoft.com/office/powerpoint/2010/main" val="2524622518"/>
+      </p:ext>
+    </p:extLst>
+  </p:cSld>
+  <p:clrMapOvr>
+    <a:masterClrMapping/>
+  </p:clrMapOvr>
+</p:sld>
+</file>
+
+<file path=ppt/slides/slide70.xml><?xml version="1.0" encoding="utf-8"?>
 <p:sld xmlns:a="http://schemas.openxmlformats.org/drawingml/2006/main" xmlns:r="http://schemas.openxmlformats.org/officeDocument/2006/relationships" xmlns:p="http://schemas.openxmlformats.org/presentationml/2006/main">
   <p:cSld>
     <p:spTree>
@@ -18904,141 +19151,7 @@
 </p:sld>
 </file>
 
-<file path=ppt/slides/slide7.xml><?xml version="1.0" encoding="utf-8"?>
-<p:sld xmlns:a="http://schemas.openxmlformats.org/drawingml/2006/main" xmlns:r="http://schemas.openxmlformats.org/officeDocument/2006/relationships" xmlns:p="http://schemas.openxmlformats.org/presentationml/2006/main">
-  <p:cSld>
-    <p:spTree>
-      <p:nvGrpSpPr>
-        <p:cNvPr id="1" name=""/>
-        <p:cNvGrpSpPr/>
-        <p:nvPr/>
-      </p:nvGrpSpPr>
-      <p:grpSpPr>
-        <a:xfrm>
-          <a:off x="0" y="0"/>
-          <a:ext cx="0" cy="0"/>
-          <a:chOff x="0" y="0"/>
-          <a:chExt cx="0" cy="0"/>
-        </a:xfrm>
-      </p:grpSpPr>
-      <p:sp>
-        <p:nvSpPr>
-          <p:cNvPr id="2" name="Title 1">
-            <a:extLst>
-              <a:ext uri="{FF2B5EF4-FFF2-40B4-BE49-F238E27FC236}">
-                <a16:creationId xmlns:a16="http://schemas.microsoft.com/office/drawing/2014/main" id="{AE4E9D02-F4B1-7DDD-4DA4-4FB21F80A804}"/>
-              </a:ext>
-            </a:extLst>
-          </p:cNvPr>
-          <p:cNvSpPr>
-            <a:spLocks noGrp="1"/>
-          </p:cNvSpPr>
-          <p:nvPr>
-            <p:ph type="title"/>
-          </p:nvPr>
-        </p:nvSpPr>
-        <p:spPr/>
-        <p:txBody>
-          <a:bodyPr/>
-          <a:lstStyle/>
-          <a:p>
-            <a:r>
-              <a:rPr lang="en-US" dirty="0"/>
-              <a:t>Where Is My Data?</a:t>
-            </a:r>
-          </a:p>
-        </p:txBody>
-      </p:sp>
-      <p:sp>
-        <p:nvSpPr>
-          <p:cNvPr id="3" name="Content Placeholder 2">
-            <a:extLst>
-              <a:ext uri="{FF2B5EF4-FFF2-40B4-BE49-F238E27FC236}">
-                <a16:creationId xmlns:a16="http://schemas.microsoft.com/office/drawing/2014/main" id="{AC869689-4A76-C95F-DF1B-1503917B22E1}"/>
-              </a:ext>
-            </a:extLst>
-          </p:cNvPr>
-          <p:cNvSpPr>
-            <a:spLocks noGrp="1"/>
-          </p:cNvSpPr>
-          <p:nvPr>
-            <p:ph idx="1"/>
-          </p:nvPr>
-        </p:nvSpPr>
-        <p:spPr/>
-        <p:txBody>
-          <a:bodyPr/>
-          <a:lstStyle/>
-          <a:p>
-            <a:r>
-              <a:rPr lang="en-US" dirty="0"/>
-              <a:t>Dedicated SQL pool</a:t>
-            </a:r>
-          </a:p>
-          <a:p>
-            <a:pPr lvl="1"/>
-            <a:r>
-              <a:rPr lang="en-US" dirty="0"/>
-              <a:t>Split into 60 distributions but can logically be considered together</a:t>
-            </a:r>
-          </a:p>
-          <a:p>
-            <a:pPr lvl="1"/>
-            <a:r>
-              <a:rPr lang="en-US" dirty="0"/>
-              <a:t>Closest thing to a “normal” database for SQL Server users, though plenty of differences</a:t>
-            </a:r>
-          </a:p>
-          <a:p>
-            <a:r>
-              <a:rPr lang="en-US" dirty="0"/>
-              <a:t>Data Lake</a:t>
-            </a:r>
-          </a:p>
-          <a:p>
-            <a:pPr lvl="1"/>
-            <a:r>
-              <a:rPr lang="en-US" dirty="0"/>
-              <a:t>Data files stored in Azure Data Lake Storage Gen2</a:t>
-            </a:r>
-          </a:p>
-          <a:p>
-            <a:pPr lvl="1"/>
-            <a:r>
-              <a:rPr lang="en-US" dirty="0"/>
-              <a:t>Typically follows a particular hierarchical breakdown:</a:t>
-            </a:r>
-            <a:br>
-              <a:rPr lang="en-US" dirty="0"/>
-            </a:br>
-            <a:r>
-              <a:rPr lang="en-US" dirty="0"/>
-              <a:t>Measure \ Year \ Month \ Day \ {Hour \ … }</a:t>
-            </a:r>
-          </a:p>
-          <a:p>
-            <a:pPr lvl="1"/>
-            <a:r>
-              <a:rPr lang="en-US" dirty="0"/>
-              <a:t>Data typically stored in quasi-structured formats:  CSV/delimited file, JSON, ORC, Parquet</a:t>
-            </a:r>
-          </a:p>
-        </p:txBody>
-      </p:sp>
-    </p:spTree>
-    <p:extLst>
-      <p:ext uri="{BB962C8B-B14F-4D97-AF65-F5344CB8AC3E}">
-        <p14:creationId xmlns:p14="http://schemas.microsoft.com/office/powerpoint/2010/main" val="2524622518"/>
-      </p:ext>
-    </p:extLst>
-  </p:cSld>
-  <p:clrMapOvr>
-    <a:masterClrMapping/>
-  </p:clrMapOvr>
-</p:sld>
-</file>
-
-<file path=ppt/slides/slide70.xml><?xml version="1.0" encoding="utf-8"?>
+<file path=ppt/slides/slide71.xml><?xml version="1.0" encoding="utf-8"?>
 <p:sld xmlns:a="http://schemas.openxmlformats.org/drawingml/2006/main" xmlns:r="http://schemas.openxmlformats.org/officeDocument/2006/relationships" xmlns:p="http://schemas.openxmlformats.org/presentationml/2006/main">
   <p:cSld>
     <p:spTree>
@@ -19199,7 +19312,7 @@
 </p:sld>
 </file>
 
-<file path=ppt/slides/slide71.xml><?xml version="1.0" encoding="utf-8"?>
+<file path=ppt/slides/slide72.xml><?xml version="1.0" encoding="utf-8"?>
 <p:sld xmlns:a="http://schemas.openxmlformats.org/drawingml/2006/main" xmlns:r="http://schemas.openxmlformats.org/officeDocument/2006/relationships" xmlns:p="http://schemas.openxmlformats.org/presentationml/2006/main">
   <p:cSld>
     <p:spTree>
@@ -19329,104 +19442,6 @@
 </p:sld>
 </file>
 
-<file path=ppt/slides/slide72.xml><?xml version="1.0" encoding="utf-8"?>
-<p:sld xmlns:a="http://schemas.openxmlformats.org/drawingml/2006/main" xmlns:r="http://schemas.openxmlformats.org/officeDocument/2006/relationships" xmlns:p="http://schemas.openxmlformats.org/presentationml/2006/main">
-  <p:cSld>
-    <p:spTree>
-      <p:nvGrpSpPr>
-        <p:cNvPr id="1" name=""/>
-        <p:cNvGrpSpPr/>
-        <p:nvPr/>
-      </p:nvGrpSpPr>
-      <p:grpSpPr>
-        <a:xfrm>
-          <a:off x="0" y="0"/>
-          <a:ext cx="0" cy="0"/>
-          <a:chOff x="0" y="0"/>
-          <a:chExt cx="0" cy="0"/>
-        </a:xfrm>
-      </p:grpSpPr>
-      <p:sp>
-        <p:nvSpPr>
-          <p:cNvPr id="2" name="Title 1">
-            <a:extLst>
-              <a:ext uri="{FF2B5EF4-FFF2-40B4-BE49-F238E27FC236}">
-                <a16:creationId xmlns:a16="http://schemas.microsoft.com/office/drawing/2014/main" id="{B22C245E-2B4F-FD50-59A0-517F533BEB13}"/>
-              </a:ext>
-            </a:extLst>
-          </p:cNvPr>
-          <p:cNvSpPr>
-            <a:spLocks noGrp="1"/>
-          </p:cNvSpPr>
-          <p:nvPr>
-            <p:ph type="title"/>
-          </p:nvPr>
-        </p:nvSpPr>
-        <p:spPr/>
-        <p:txBody>
-          <a:bodyPr/>
-          <a:lstStyle/>
-          <a:p>
-            <a:r>
-              <a:rPr lang="en-US" dirty="0"/>
-              <a:t>Lab Part 3</a:t>
-            </a:r>
-          </a:p>
-        </p:txBody>
-      </p:sp>
-      <p:sp>
-        <p:nvSpPr>
-          <p:cNvPr id="3" name="Content Placeholder 2">
-            <a:extLst>
-              <a:ext uri="{FF2B5EF4-FFF2-40B4-BE49-F238E27FC236}">
-                <a16:creationId xmlns:a16="http://schemas.microsoft.com/office/drawing/2014/main" id="{566CAAAE-75F3-7B5E-C61A-03FF68C88573}"/>
-              </a:ext>
-            </a:extLst>
-          </p:cNvPr>
-          <p:cNvSpPr>
-            <a:spLocks noGrp="1"/>
-          </p:cNvSpPr>
-          <p:nvPr>
-            <p:ph idx="1"/>
-          </p:nvPr>
-        </p:nvSpPr>
-        <p:spPr/>
-        <p:txBody>
-          <a:bodyPr/>
-          <a:lstStyle/>
-          <a:p>
-            <a:r>
-              <a:rPr lang="en-US" dirty="0"/>
-              <a:t>Convert notebook into Synapse pipeline</a:t>
-            </a:r>
-          </a:p>
-          <a:p>
-            <a:r>
-              <a:rPr lang="en-US" dirty="0"/>
-              <a:t>Execute notebook</a:t>
-            </a:r>
-          </a:p>
-          <a:p>
-            <a:r>
-              <a:rPr lang="en-US" dirty="0"/>
-              <a:t>Trigger on new data</a:t>
-            </a:r>
-          </a:p>
-        </p:txBody>
-      </p:sp>
-    </p:spTree>
-    <p:extLst>
-      <p:ext uri="{BB962C8B-B14F-4D97-AF65-F5344CB8AC3E}">
-        <p14:creationId xmlns:p14="http://schemas.microsoft.com/office/powerpoint/2010/main" val="1127114026"/>
-      </p:ext>
-    </p:extLst>
-  </p:cSld>
-  <p:clrMapOvr>
-    <a:masterClrMapping/>
-  </p:clrMapOvr>
-</p:sld>
-</file>
-
 <file path=ppt/slides/slide73.xml><?xml version="1.0" encoding="utf-8"?>
 <p:sld xmlns:a="http://schemas.openxmlformats.org/drawingml/2006/main" xmlns:r="http://schemas.openxmlformats.org/officeDocument/2006/relationships" xmlns:p="http://schemas.openxmlformats.org/presentationml/2006/main">
   <p:cSld>
@@ -19449,6 +19464,104 @@
           <p:cNvPr id="2" name="Title 1">
             <a:extLst>
               <a:ext uri="{FF2B5EF4-FFF2-40B4-BE49-F238E27FC236}">
+                <a16:creationId xmlns:a16="http://schemas.microsoft.com/office/drawing/2014/main" id="{B22C245E-2B4F-FD50-59A0-517F533BEB13}"/>
+              </a:ext>
+            </a:extLst>
+          </p:cNvPr>
+          <p:cNvSpPr>
+            <a:spLocks noGrp="1"/>
+          </p:cNvSpPr>
+          <p:nvPr>
+            <p:ph type="title"/>
+          </p:nvPr>
+        </p:nvSpPr>
+        <p:spPr/>
+        <p:txBody>
+          <a:bodyPr/>
+          <a:lstStyle/>
+          <a:p>
+            <a:r>
+              <a:rPr lang="en-US" dirty="0"/>
+              <a:t>Lab Part 3</a:t>
+            </a:r>
+          </a:p>
+        </p:txBody>
+      </p:sp>
+      <p:sp>
+        <p:nvSpPr>
+          <p:cNvPr id="3" name="Content Placeholder 2">
+            <a:extLst>
+              <a:ext uri="{FF2B5EF4-FFF2-40B4-BE49-F238E27FC236}">
+                <a16:creationId xmlns:a16="http://schemas.microsoft.com/office/drawing/2014/main" id="{566CAAAE-75F3-7B5E-C61A-03FF68C88573}"/>
+              </a:ext>
+            </a:extLst>
+          </p:cNvPr>
+          <p:cNvSpPr>
+            <a:spLocks noGrp="1"/>
+          </p:cNvSpPr>
+          <p:nvPr>
+            <p:ph idx="1"/>
+          </p:nvPr>
+        </p:nvSpPr>
+        <p:spPr/>
+        <p:txBody>
+          <a:bodyPr/>
+          <a:lstStyle/>
+          <a:p>
+            <a:r>
+              <a:rPr lang="en-US" dirty="0"/>
+              <a:t>Convert notebook into Synapse pipeline</a:t>
+            </a:r>
+          </a:p>
+          <a:p>
+            <a:r>
+              <a:rPr lang="en-US" dirty="0"/>
+              <a:t>Execute notebook</a:t>
+            </a:r>
+          </a:p>
+          <a:p>
+            <a:r>
+              <a:rPr lang="en-US" dirty="0"/>
+              <a:t>Trigger on new data</a:t>
+            </a:r>
+          </a:p>
+        </p:txBody>
+      </p:sp>
+    </p:spTree>
+    <p:extLst>
+      <p:ext uri="{BB962C8B-B14F-4D97-AF65-F5344CB8AC3E}">
+        <p14:creationId xmlns:p14="http://schemas.microsoft.com/office/powerpoint/2010/main" val="1127114026"/>
+      </p:ext>
+    </p:extLst>
+  </p:cSld>
+  <p:clrMapOvr>
+    <a:masterClrMapping/>
+  </p:clrMapOvr>
+</p:sld>
+</file>
+
+<file path=ppt/slides/slide74.xml><?xml version="1.0" encoding="utf-8"?>
+<p:sld xmlns:a="http://schemas.openxmlformats.org/drawingml/2006/main" xmlns:r="http://schemas.openxmlformats.org/officeDocument/2006/relationships" xmlns:p="http://schemas.openxmlformats.org/presentationml/2006/main">
+  <p:cSld>
+    <p:spTree>
+      <p:nvGrpSpPr>
+        <p:cNvPr id="1" name=""/>
+        <p:cNvGrpSpPr/>
+        <p:nvPr/>
+      </p:nvGrpSpPr>
+      <p:grpSpPr>
+        <a:xfrm>
+          <a:off x="0" y="0"/>
+          <a:ext cx="0" cy="0"/>
+          <a:chOff x="0" y="0"/>
+          <a:chExt cx="0" cy="0"/>
+        </a:xfrm>
+      </p:grpSpPr>
+      <p:sp>
+        <p:nvSpPr>
+          <p:cNvPr id="2" name="Title 1">
+            <a:extLst>
+              <a:ext uri="{FF2B5EF4-FFF2-40B4-BE49-F238E27FC236}">
                 <a16:creationId xmlns:a16="http://schemas.microsoft.com/office/drawing/2014/main" id="{F1BF4DF7-6ECF-F443-4A77-36AB5447924C}"/>
               </a:ext>
             </a:extLst>
@@ -19515,7 +19628,7 @@
 </p:sld>
 </file>
 
-<file path=ppt/slides/slide74.xml><?xml version="1.0" encoding="utf-8"?>
+<file path=ppt/slides/slide75.xml><?xml version="1.0" encoding="utf-8"?>
 <p:sld xmlns:a="http://schemas.openxmlformats.org/drawingml/2006/main" xmlns:r="http://schemas.openxmlformats.org/officeDocument/2006/relationships" xmlns:p="http://schemas.openxmlformats.org/presentationml/2006/main">
   <p:cSld>
     <p:spTree>

</xml_diff>

<commit_message>
Create lab notes for part 3
</commit_message>
<xml_diff>
--- a/Slides/02 - Synapse Development.pptx
+++ b/Slides/02 - Synapse Development.pptx
@@ -278,7 +278,7 @@
           <a:p>
             <a:fld id="{A9E87CA4-4457-4F5E-BAFC-B765C0B66170}" type="datetimeFigureOut">
               <a:rPr lang="en-US" smtClean="0"/>
-              <a:t>10/29/2022</a:t>
+              <a:t>11/17/2022</a:t>
             </a:fld>
             <a:endParaRPr lang="en-US"/>
           </a:p>
@@ -776,7 +776,7 @@
           <a:p>
             <a:fld id="{9CBAA52B-0432-40D9-AEE2-5FF9967BACCD}" type="datetimeFigureOut">
               <a:rPr lang="en-US" smtClean="0"/>
-              <a:t>10/24/2022</a:t>
+              <a:t>11/17/2022</a:t>
             </a:fld>
             <a:endParaRPr lang="en-US"/>
           </a:p>
@@ -974,7 +974,7 @@
           <a:p>
             <a:fld id="{9CBAA52B-0432-40D9-AEE2-5FF9967BACCD}" type="datetimeFigureOut">
               <a:rPr lang="en-US" smtClean="0"/>
-              <a:t>10/24/2022</a:t>
+              <a:t>11/17/2022</a:t>
             </a:fld>
             <a:endParaRPr lang="en-US"/>
           </a:p>
@@ -1182,7 +1182,7 @@
           <a:p>
             <a:fld id="{9CBAA52B-0432-40D9-AEE2-5FF9967BACCD}" type="datetimeFigureOut">
               <a:rPr lang="en-US" smtClean="0"/>
-              <a:t>10/24/2022</a:t>
+              <a:t>11/17/2022</a:t>
             </a:fld>
             <a:endParaRPr lang="en-US"/>
           </a:p>
@@ -1611,7 +1611,7 @@
           <a:p>
             <a:fld id="{9CBAA52B-0432-40D9-AEE2-5FF9967BACCD}" type="datetimeFigureOut">
               <a:rPr lang="en-US" smtClean="0"/>
-              <a:t>10/24/2022</a:t>
+              <a:t>11/17/2022</a:t>
             </a:fld>
             <a:endParaRPr lang="en-US"/>
           </a:p>
@@ -1886,7 +1886,7 @@
           <a:p>
             <a:fld id="{9CBAA52B-0432-40D9-AEE2-5FF9967BACCD}" type="datetimeFigureOut">
               <a:rPr lang="en-US" smtClean="0"/>
-              <a:t>10/24/2022</a:t>
+              <a:t>11/17/2022</a:t>
             </a:fld>
             <a:endParaRPr lang="en-US"/>
           </a:p>
@@ -2151,7 +2151,7 @@
           <a:p>
             <a:fld id="{9CBAA52B-0432-40D9-AEE2-5FF9967BACCD}" type="datetimeFigureOut">
               <a:rPr lang="en-US" smtClean="0"/>
-              <a:t>10/24/2022</a:t>
+              <a:t>11/17/2022</a:t>
             </a:fld>
             <a:endParaRPr lang="en-US"/>
           </a:p>
@@ -2563,7 +2563,7 @@
           <a:p>
             <a:fld id="{9CBAA52B-0432-40D9-AEE2-5FF9967BACCD}" type="datetimeFigureOut">
               <a:rPr lang="en-US" smtClean="0"/>
-              <a:t>10/24/2022</a:t>
+              <a:t>11/17/2022</a:t>
             </a:fld>
             <a:endParaRPr lang="en-US"/>
           </a:p>
@@ -2704,7 +2704,7 @@
           <a:p>
             <a:fld id="{9CBAA52B-0432-40D9-AEE2-5FF9967BACCD}" type="datetimeFigureOut">
               <a:rPr lang="en-US" smtClean="0"/>
-              <a:t>10/24/2022</a:t>
+              <a:t>11/17/2022</a:t>
             </a:fld>
             <a:endParaRPr lang="en-US"/>
           </a:p>
@@ -2817,7 +2817,7 @@
           <a:p>
             <a:fld id="{9CBAA52B-0432-40D9-AEE2-5FF9967BACCD}" type="datetimeFigureOut">
               <a:rPr lang="en-US" smtClean="0"/>
-              <a:t>10/24/2022</a:t>
+              <a:t>11/17/2022</a:t>
             </a:fld>
             <a:endParaRPr lang="en-US"/>
           </a:p>
@@ -3128,7 +3128,7 @@
           <a:p>
             <a:fld id="{9CBAA52B-0432-40D9-AEE2-5FF9967BACCD}" type="datetimeFigureOut">
               <a:rPr lang="en-US" smtClean="0"/>
-              <a:t>10/24/2022</a:t>
+              <a:t>11/17/2022</a:t>
             </a:fld>
             <a:endParaRPr lang="en-US"/>
           </a:p>
@@ -3416,7 +3416,7 @@
           <a:p>
             <a:fld id="{9CBAA52B-0432-40D9-AEE2-5FF9967BACCD}" type="datetimeFigureOut">
               <a:rPr lang="en-US" smtClean="0"/>
-              <a:t>10/24/2022</a:t>
+              <a:t>11/17/2022</a:t>
             </a:fld>
             <a:endParaRPr lang="en-US"/>
           </a:p>
@@ -3657,7 +3657,7 @@
           <a:p>
             <a:fld id="{9CBAA52B-0432-40D9-AEE2-5FF9967BACCD}" type="datetimeFigureOut">
               <a:rPr lang="en-US" smtClean="0"/>
-              <a:t>10/24/2022</a:t>
+              <a:t>11/17/2022</a:t>
             </a:fld>
             <a:endParaRPr lang="en-US"/>
           </a:p>
@@ -13974,19 +13974,21 @@
           <a:p>
             <a:r>
               <a:rPr lang="en-US" dirty="0"/>
-              <a:t>Process data with Python and Spark SQL</a:t>
-            </a:r>
-          </a:p>
-          <a:p>
-            <a:r>
-              <a:rPr lang="en-US" dirty="0"/>
-              <a:t>Perform basic machine learning with Python</a:t>
-            </a:r>
-          </a:p>
-          <a:p>
-            <a:r>
-              <a:rPr lang="en-US" dirty="0"/>
-              <a:t>Write results to the data lake</a:t>
+              <a:t>Process data with Python and </a:t>
+            </a:r>
+            <a:r>
+              <a:rPr lang="en-US"/>
+              <a:t>Spark SQL</a:t>
+            </a:r>
+          </a:p>
+          <a:p>
+            <a:r>
+              <a:rPr lang="en-US"/>
+              <a:t>Write </a:t>
+            </a:r>
+            <a:r>
+              <a:rPr lang="en-US" dirty="0"/>
+              <a:t>results to the data lake</a:t>
             </a:r>
           </a:p>
         </p:txBody>

</xml_diff>